<commit_message>
L12 Add user-agent-request-blocking and request-logging filter to home task
</commit_message>
<xml_diff>
--- a/Lectures/Lesson 12 - Servlet API.pptx
+++ b/Lectures/Lesson 12 - Servlet API.pptx
@@ -235,7 +235,7 @@
           <a:p>
             <a:fld id="{C0C2FFA2-5F87-4095-984D-B556F5206AAF}" type="datetimeFigureOut">
               <a:rPr lang="en-US" smtClean="0"/>
-              <a:t>1/13/2019</a:t>
+              <a:t>1/14/2019</a:t>
             </a:fld>
             <a:endParaRPr lang="en-US"/>
           </a:p>
@@ -1603,7 +1603,7 @@
           <a:p>
             <a:fld id="{4A87C8C0-574D-44BC-9414-8B350098B443}" type="datetimeFigureOut">
               <a:rPr lang="en-US" smtClean="0"/>
-              <a:t>1/13/2019</a:t>
+              <a:t>1/14/2019</a:t>
             </a:fld>
             <a:endParaRPr lang="en-US"/>
           </a:p>
@@ -1773,7 +1773,7 @@
           <a:p>
             <a:fld id="{4A87C8C0-574D-44BC-9414-8B350098B443}" type="datetimeFigureOut">
               <a:rPr lang="en-US" smtClean="0"/>
-              <a:t>1/13/2019</a:t>
+              <a:t>1/14/2019</a:t>
             </a:fld>
             <a:endParaRPr lang="en-US"/>
           </a:p>
@@ -1953,7 +1953,7 @@
           <a:p>
             <a:fld id="{4A87C8C0-574D-44BC-9414-8B350098B443}" type="datetimeFigureOut">
               <a:rPr lang="en-US" smtClean="0"/>
-              <a:t>1/13/2019</a:t>
+              <a:t>1/14/2019</a:t>
             </a:fld>
             <a:endParaRPr lang="en-US"/>
           </a:p>
@@ -2123,7 +2123,7 @@
           <a:p>
             <a:fld id="{4A87C8C0-574D-44BC-9414-8B350098B443}" type="datetimeFigureOut">
               <a:rPr lang="en-US" smtClean="0"/>
-              <a:t>1/13/2019</a:t>
+              <a:t>1/14/2019</a:t>
             </a:fld>
             <a:endParaRPr lang="en-US"/>
           </a:p>
@@ -2369,7 +2369,7 @@
           <a:p>
             <a:fld id="{4A87C8C0-574D-44BC-9414-8B350098B443}" type="datetimeFigureOut">
               <a:rPr lang="en-US" smtClean="0"/>
-              <a:t>1/13/2019</a:t>
+              <a:t>1/14/2019</a:t>
             </a:fld>
             <a:endParaRPr lang="en-US"/>
           </a:p>
@@ -2601,7 +2601,7 @@
           <a:p>
             <a:fld id="{4A87C8C0-574D-44BC-9414-8B350098B443}" type="datetimeFigureOut">
               <a:rPr lang="en-US" smtClean="0"/>
-              <a:t>1/13/2019</a:t>
+              <a:t>1/14/2019</a:t>
             </a:fld>
             <a:endParaRPr lang="en-US"/>
           </a:p>
@@ -2968,7 +2968,7 @@
           <a:p>
             <a:fld id="{4A87C8C0-574D-44BC-9414-8B350098B443}" type="datetimeFigureOut">
               <a:rPr lang="en-US" smtClean="0"/>
-              <a:t>1/13/2019</a:t>
+              <a:t>1/14/2019</a:t>
             </a:fld>
             <a:endParaRPr lang="en-US"/>
           </a:p>
@@ -3086,7 +3086,7 @@
           <a:p>
             <a:fld id="{4A87C8C0-574D-44BC-9414-8B350098B443}" type="datetimeFigureOut">
               <a:rPr lang="en-US" smtClean="0"/>
-              <a:t>1/13/2019</a:t>
+              <a:t>1/14/2019</a:t>
             </a:fld>
             <a:endParaRPr lang="en-US"/>
           </a:p>
@@ -3181,7 +3181,7 @@
           <a:p>
             <a:fld id="{4A87C8C0-574D-44BC-9414-8B350098B443}" type="datetimeFigureOut">
               <a:rPr lang="en-US" smtClean="0"/>
-              <a:t>1/13/2019</a:t>
+              <a:t>1/14/2019</a:t>
             </a:fld>
             <a:endParaRPr lang="en-US"/>
           </a:p>
@@ -3458,7 +3458,7 @@
           <a:p>
             <a:fld id="{4A87C8C0-574D-44BC-9414-8B350098B443}" type="datetimeFigureOut">
               <a:rPr lang="en-US" smtClean="0"/>
-              <a:t>1/13/2019</a:t>
+              <a:t>1/14/2019</a:t>
             </a:fld>
             <a:endParaRPr lang="en-US"/>
           </a:p>
@@ -3711,7 +3711,7 @@
           <a:p>
             <a:fld id="{4A87C8C0-574D-44BC-9414-8B350098B443}" type="datetimeFigureOut">
               <a:rPr lang="en-US" smtClean="0"/>
-              <a:t>1/13/2019</a:t>
+              <a:t>1/14/2019</a:t>
             </a:fld>
             <a:endParaRPr lang="en-US"/>
           </a:p>
@@ -3924,7 +3924,7 @@
           <a:p>
             <a:fld id="{4A87C8C0-574D-44BC-9414-8B350098B443}" type="datetimeFigureOut">
               <a:rPr lang="en-US" smtClean="0"/>
-              <a:t>1/13/2019</a:t>
+              <a:t>1/14/2019</a:t>
             </a:fld>
             <a:endParaRPr lang="en-US"/>
           </a:p>
@@ -4697,11 +4697,7 @@
             </a:r>
             <a:r>
               <a:rPr lang="en-US" sz="2000" dirty="0" smtClean="0"/>
-              <a:t>service(...) </a:t>
-            </a:r>
-            <a:r>
-              <a:rPr lang="en-US" sz="2000" dirty="0" smtClean="0"/>
-              <a:t>method, </a:t>
+              <a:t>service(...) method, </a:t>
             </a:r>
             <a:r>
               <a:rPr lang="en-US" sz="2000" dirty="0" err="1" smtClean="0"/>
@@ -5173,11 +5169,7 @@
             </a:r>
             <a:r>
               <a:rPr lang="en-US" sz="2000" dirty="0" smtClean="0"/>
-              <a:t>do</a:t>
-            </a:r>
-            <a:r>
-              <a:rPr lang="en-US" sz="2000" dirty="0" smtClean="0"/>
-              <a:t>...(...)</a:t>
+              <a:t>do...(...)</a:t>
             </a:r>
             <a:endParaRPr lang="en-US" sz="2000" dirty="0"/>
           </a:p>
@@ -9383,11 +9375,7 @@
           <a:p>
             <a:r>
               <a:rPr lang="en-US" sz="3600" dirty="0" smtClean="0"/>
-              <a:t>Java </a:t>
-            </a:r>
-            <a:r>
-              <a:rPr lang="en-US" sz="3600" dirty="0" smtClean="0"/>
-              <a:t>Servlet</a:t>
+              <a:t>Java Servlet</a:t>
             </a:r>
           </a:p>
           <a:p>
@@ -9395,7 +9383,6 @@
               <a:rPr lang="en-US" sz="3600" dirty="0" smtClean="0"/>
               <a:t>Tomcat</a:t>
             </a:r>
-            <a:endParaRPr lang="en-US" sz="3600" dirty="0" smtClean="0"/>
           </a:p>
         </p:txBody>
       </p:sp>
@@ -10181,7 +10168,6 @@
               <a:rPr lang="en-US" sz="2000" dirty="0" smtClean="0"/>
               <a:t>resources…</a:t>
             </a:r>
-            <a:endParaRPr lang="en-US" sz="2000" dirty="0" smtClean="0"/>
           </a:p>
         </p:txBody>
       </p:sp>
@@ -10552,7 +10538,7 @@
         </p:spPr>
         <p:txBody>
           <a:bodyPr>
-            <a:normAutofit lnSpcReduction="10000"/>
+            <a:normAutofit fontScale="70000" lnSpcReduction="20000"/>
           </a:bodyPr>
           <a:lstStyle/>
           <a:p>
@@ -10618,17 +10604,7 @@
                 <a:latin typeface="Courier New" panose="02070309020205020404" pitchFamily="49" charset="0"/>
                 <a:cs typeface="Courier New" panose="02070309020205020404" pitchFamily="49" charset="0"/>
               </a:rPr>
-              <a:t>=[add/update/remove/invalidate]&amp;name=...&amp;value</a:t>
-            </a:r>
-            <a:r>
-              <a:rPr lang="en-US" sz="2000" dirty="0" smtClean="0">
-                <a:solidFill>
-                  <a:srgbClr val="C00000"/>
-                </a:solidFill>
-                <a:latin typeface="Courier New" panose="02070309020205020404" pitchFamily="49" charset="0"/>
-                <a:cs typeface="Courier New" panose="02070309020205020404" pitchFamily="49" charset="0"/>
-              </a:rPr>
-              <a:t>=...`</a:t>
+              <a:t>=[add/update/remove/invalidate]&amp;name=...&amp;value=...`</a:t>
             </a:r>
           </a:p>
           <a:p>
@@ -10760,7 +10736,6 @@
               <a:rPr lang="en-US" sz="1600" dirty="0"/>
               <a:t>;</a:t>
             </a:r>
-            <a:endParaRPr lang="en-US" sz="1600" dirty="0"/>
           </a:p>
           <a:p>
             <a:pPr lvl="1">
@@ -10853,9 +10828,20 @@
             </a:pPr>
             <a:r>
               <a:rPr lang="en-US" sz="2000" dirty="0" smtClean="0"/>
-              <a:t>3. Add filter, when user browser is ‘Microsoft Edge’ – block request and show error page</a:t>
-            </a:r>
-            <a:endParaRPr lang="en-US" sz="2000" dirty="0"/>
+              <a:t>3. Add </a:t>
+            </a:r>
+            <a:r>
+              <a:rPr lang="en-US" sz="2000" dirty="0" smtClean="0"/>
+              <a:t>request blocking filter</a:t>
+            </a:r>
+            <a:r>
+              <a:rPr lang="en-US" sz="2000" dirty="0" smtClean="0"/>
+              <a:t>, when user browser is ‘Microsoft Edge’ – block request and show error </a:t>
+            </a:r>
+            <a:r>
+              <a:rPr lang="en-US" sz="2000" dirty="0" smtClean="0"/>
+              <a:t>page. Use </a:t>
+            </a:r>
           </a:p>
           <a:p>
             <a:pPr marL="0" indent="0">
@@ -10866,7 +10852,64 @@
             </a:pPr>
             <a:r>
               <a:rPr lang="en-US" sz="2000" dirty="0" smtClean="0"/>
-              <a:t>4. Attributes lists should not be shared between two browsers</a:t>
+              <a:t>4. </a:t>
+            </a:r>
+            <a:r>
+              <a:rPr lang="en-US" sz="2000" dirty="0"/>
+              <a:t>Add </a:t>
+            </a:r>
+            <a:r>
+              <a:rPr lang="en-US" sz="2000" dirty="0" smtClean="0"/>
+              <a:t>separate request logging filter. Log endpoints path and total execution time. Should measure all actions (even when request blocked)</a:t>
+            </a:r>
+          </a:p>
+          <a:p>
+            <a:pPr marL="0" indent="0">
+              <a:lnSpc>
+                <a:spcPct val="150000"/>
+              </a:lnSpc>
+              <a:buNone/>
+            </a:pPr>
+            <a:r>
+              <a:rPr lang="en-US" sz="2000" dirty="0"/>
+              <a:t>5</a:t>
+            </a:r>
+            <a:r>
+              <a:rPr lang="en-US" sz="2000" dirty="0" smtClean="0"/>
+              <a:t>. </a:t>
+            </a:r>
+            <a:r>
+              <a:rPr lang="en-US" sz="2000" dirty="0"/>
+              <a:t>Add separate request </a:t>
+            </a:r>
+            <a:r>
+              <a:rPr lang="en-US" sz="2000" dirty="0" smtClean="0"/>
+              <a:t>blocking </a:t>
+            </a:r>
+            <a:r>
+              <a:rPr lang="en-US" sz="2000" dirty="0"/>
+              <a:t>filter. </a:t>
+            </a:r>
+            <a:r>
+              <a:rPr lang="en-US" sz="2000" dirty="0" smtClean="0"/>
+              <a:t>When today is weekend – deny all operations. Microsoft Edge users should never come here and be stopped by user-agent filter.</a:t>
+            </a:r>
+            <a:endParaRPr lang="en-US" sz="2000" dirty="0"/>
+          </a:p>
+          <a:p>
+            <a:pPr marL="0" indent="0">
+              <a:lnSpc>
+                <a:spcPct val="150000"/>
+              </a:lnSpc>
+              <a:buNone/>
+            </a:pPr>
+            <a:r>
+              <a:rPr lang="en-US" sz="2000" dirty="0" smtClean="0"/>
+              <a:t>6. </a:t>
+            </a:r>
+            <a:r>
+              <a:rPr lang="en-US" sz="2000" dirty="0" smtClean="0"/>
+              <a:t>Attributes lists should not be shared between two browsers</a:t>
             </a:r>
             <a:endParaRPr lang="en-US" sz="2000" dirty="0"/>
           </a:p>
@@ -11610,7 +11653,6 @@
               <a:rPr lang="en-US" sz="2400" dirty="0" smtClean="0"/>
               <a:t>state</a:t>
             </a:r>
-            <a:endParaRPr lang="en-US" sz="2400" dirty="0" smtClean="0"/>
           </a:p>
         </p:txBody>
       </p:sp>
@@ -11847,11 +11889,7 @@
           <a:p>
             <a:r>
               <a:rPr lang="en-US" dirty="0" smtClean="0"/>
-              <a:t>Java </a:t>
-            </a:r>
-            <a:r>
-              <a:rPr lang="en-US" dirty="0" smtClean="0"/>
-              <a:t>Servlet</a:t>
+              <a:t>Java Servlet</a:t>
             </a:r>
             <a:endParaRPr lang="en-US" dirty="0"/>
           </a:p>

</xml_diff>